<commit_message>
Added powerpoint file to fig folder
</commit_message>
<xml_diff>
--- a/fig/Cultivating a Culture of Digital Preservation.pptx
+++ b/fig/Cultivating a Culture of Digital Preservation.pptx
@@ -5,19 +5,18 @@
     <p:sldMasterId id="2147483864" r:id="rId1"/>
   </p:sldMasterIdLst>
   <p:notesMasterIdLst>
-    <p:notesMasterId r:id="rId12"/>
+    <p:notesMasterId r:id="rId11"/>
   </p:notesMasterIdLst>
   <p:sldIdLst>
     <p:sldId id="256" r:id="rId2"/>
-    <p:sldId id="259" r:id="rId3"/>
-    <p:sldId id="257" r:id="rId4"/>
-    <p:sldId id="265" r:id="rId5"/>
-    <p:sldId id="263" r:id="rId6"/>
+    <p:sldId id="257" r:id="rId3"/>
+    <p:sldId id="259" r:id="rId4"/>
+    <p:sldId id="263" r:id="rId5"/>
+    <p:sldId id="265" r:id="rId6"/>
     <p:sldId id="260" r:id="rId7"/>
     <p:sldId id="258" r:id="rId8"/>
     <p:sldId id="264" r:id="rId9"/>
-    <p:sldId id="261" r:id="rId10"/>
-    <p:sldId id="262" r:id="rId11"/>
+    <p:sldId id="262" r:id="rId10"/>
   </p:sldIdLst>
   <p:sldSz cx="12192000" cy="6858000"/>
   <p:notesSz cx="6858000" cy="9144000"/>
@@ -116,6 +115,11 @@
       </a:defRPr>
     </a:lvl9pPr>
   </p:defaultTextStyle>
+  <p:extLst>
+    <p:ext uri="{EFAFB233-063F-42B5-8137-9DF3F51BA10A}">
+      <p15:sldGuideLst xmlns:p15="http://schemas.microsoft.com/office/powerpoint/2012/main"/>
+    </p:ext>
+  </p:extLst>
 </p:presentation>
 </file>
 
@@ -544,6 +548,110 @@
     <p:extLst>
       <p:ext uri="{BB962C8B-B14F-4D97-AF65-F5344CB8AC3E}">
         <p14:creationId xmlns:p14="http://schemas.microsoft.com/office/powerpoint/2010/main" val="3970480468"/>
+      </p:ext>
+    </p:extLst>
+  </p:cSld>
+  <p:clrMapOvr>
+    <a:masterClrMapping/>
+  </p:clrMapOvr>
+</p:notes>
+</file>
+
+<file path=ppt/notesSlides/notesSlide2.xml><?xml version="1.0" encoding="utf-8"?>
+<p:notes xmlns:a="http://schemas.openxmlformats.org/drawingml/2006/main" xmlns:r="http://schemas.openxmlformats.org/officeDocument/2006/relationships" xmlns:p="http://schemas.openxmlformats.org/presentationml/2006/main">
+  <p:cSld>
+    <p:spTree>
+      <p:nvGrpSpPr>
+        <p:cNvPr id="1" name=""/>
+        <p:cNvGrpSpPr/>
+        <p:nvPr/>
+      </p:nvGrpSpPr>
+      <p:grpSpPr>
+        <a:xfrm>
+          <a:off x="0" y="0"/>
+          <a:ext cx="0" cy="0"/>
+          <a:chOff x="0" y="0"/>
+          <a:chExt cx="0" cy="0"/>
+        </a:xfrm>
+      </p:grpSpPr>
+      <p:sp>
+        <p:nvSpPr>
+          <p:cNvPr id="2" name="Slide Image Placeholder 1"/>
+          <p:cNvSpPr>
+            <a:spLocks noGrp="1" noRot="1" noChangeAspect="1"/>
+          </p:cNvSpPr>
+          <p:nvPr>
+            <p:ph type="sldImg"/>
+          </p:nvPr>
+        </p:nvSpPr>
+        <p:spPr/>
+      </p:sp>
+      <p:sp>
+        <p:nvSpPr>
+          <p:cNvPr id="3" name="Notes Placeholder 2"/>
+          <p:cNvSpPr>
+            <a:spLocks noGrp="1"/>
+          </p:cNvSpPr>
+          <p:nvPr>
+            <p:ph type="body" idx="1"/>
+          </p:nvPr>
+        </p:nvSpPr>
+        <p:spPr/>
+        <p:txBody>
+          <a:bodyPr/>
+          <a:lstStyle/>
+          <a:p>
+            <a:r>
+              <a:rPr lang="en-US" dirty="0" smtClean="0"/>
+              <a:t>Digitization</a:t>
+            </a:r>
+            <a:r>
+              <a:rPr lang="en-US" baseline="0" dirty="0" smtClean="0"/>
+              <a:t> is not always equivalent to </a:t>
+            </a:r>
+            <a:r>
+              <a:rPr lang="en-US" dirty="0" smtClean="0"/>
+              <a:t>access. Many obstacles exist when</a:t>
+            </a:r>
+            <a:r>
+              <a:rPr lang="en-US" baseline="0" dirty="0" smtClean="0"/>
+              <a:t> trying to make digitized materials accessible. Digital file formats are susceptible to </a:t>
+            </a:r>
+            <a:r>
+              <a:rPr lang="en-US" baseline="0" smtClean="0"/>
+              <a:t>bit rot</a:t>
+            </a:r>
+            <a:endParaRPr lang="en-US" dirty="0"/>
+          </a:p>
+        </p:txBody>
+      </p:sp>
+      <p:sp>
+        <p:nvSpPr>
+          <p:cNvPr id="4" name="Slide Number Placeholder 3"/>
+          <p:cNvSpPr>
+            <a:spLocks noGrp="1"/>
+          </p:cNvSpPr>
+          <p:nvPr>
+            <p:ph type="sldNum" sz="quarter" idx="10"/>
+          </p:nvPr>
+        </p:nvSpPr>
+        <p:spPr/>
+        <p:txBody>
+          <a:bodyPr/>
+          <a:lstStyle/>
+          <a:p>
+            <a:fld id="{0E69CC43-81AB-412A-B488-605D27FEDBE5}" type="slidenum">
+              <a:rPr lang="en-US" smtClean="0"/>
+              <a:t>2</a:t>
+            </a:fld>
+            <a:endParaRPr lang="en-US"/>
+          </a:p>
+        </p:txBody>
+      </p:sp>
+    </p:spTree>
+    <p:extLst>
+      <p:ext uri="{BB962C8B-B14F-4D97-AF65-F5344CB8AC3E}">
+        <p14:creationId xmlns:p14="http://schemas.microsoft.com/office/powerpoint/2010/main" val="1629063942"/>
       </p:ext>
     </p:extLst>
   </p:cSld>
@@ -6246,7 +6354,7 @@
 </p:sld>
 </file>
 
-<file path=ppt/slides/slide10.xml><?xml version="1.0" encoding="utf-8"?>
+<file path=ppt/slides/slide2.xml><?xml version="1.0" encoding="utf-8"?>
 <p:sld xmlns:a="http://schemas.openxmlformats.org/drawingml/2006/main" xmlns:r="http://schemas.openxmlformats.org/officeDocument/2006/relationships" xmlns:p="http://schemas.openxmlformats.org/presentationml/2006/main">
   <p:cSld>
     <p:spTree>
@@ -6265,25 +6373,6 @@
       </p:grpSpPr>
       <p:sp>
         <p:nvSpPr>
-          <p:cNvPr id="2" name="Title 1"/>
-          <p:cNvSpPr>
-            <a:spLocks noGrp="1"/>
-          </p:cNvSpPr>
-          <p:nvPr>
-            <p:ph type="title"/>
-          </p:nvPr>
-        </p:nvSpPr>
-        <p:spPr/>
-        <p:txBody>
-          <a:bodyPr/>
-          <a:lstStyle/>
-          <a:p>
-            <a:endParaRPr lang="en-US"/>
-          </a:p>
-        </p:txBody>
-      </p:sp>
-      <p:sp>
-        <p:nvSpPr>
           <p:cNvPr id="3" name="Content Placeholder 2"/>
           <p:cNvSpPr>
             <a:spLocks noGrp="1"/>
@@ -6292,38 +6381,204 @@
             <p:ph idx="1"/>
           </p:nvPr>
         </p:nvSpPr>
-        <p:spPr/>
-        <p:txBody>
-          <a:bodyPr/>
-          <a:lstStyle/>
-          <a:p>
-            <a:r>
-              <a:rPr lang="en-US" dirty="0" smtClean="0"/>
-              <a:t>OAIS Reference Model</a:t>
-            </a:r>
-          </a:p>
-          <a:p>
+        <p:spPr>
+          <a:xfrm>
+            <a:off x="5755821" y="186404"/>
+            <a:ext cx="6114125" cy="5695950"/>
+          </a:xfrm>
+        </p:spPr>
+        <p:txBody>
+          <a:bodyPr>
+            <a:normAutofit/>
+          </a:bodyPr>
+          <a:lstStyle/>
+          <a:p>
+            <a:pPr marL="0" indent="0" algn="ctr">
+              <a:buNone/>
+            </a:pPr>
+            <a:endParaRPr lang="en-US" sz="2800" dirty="0" smtClean="0"/>
+          </a:p>
+          <a:p>
+            <a:pPr marL="0" indent="0" algn="ctr">
+              <a:buNone/>
+            </a:pPr>
+            <a:endParaRPr lang="en-US" sz="2400" dirty="0" smtClean="0"/>
+          </a:p>
+          <a:p>
+            <a:pPr marL="0" indent="0" algn="ctr">
+              <a:buNone/>
+            </a:pPr>
+            <a:r>
+              <a:rPr lang="en-US" sz="3200" dirty="0" smtClean="0"/>
+              <a:t>Digitization </a:t>
+            </a:r>
+            <a:r>
+              <a:rPr lang="en-US" sz="3200" dirty="0" smtClean="0">
+                <a:effectLst>
+                  <a:outerShdw blurRad="38100" dist="38100" dir="2700000" algn="tl">
+                    <a:srgbClr val="000000">
+                      <a:alpha val="43137"/>
+                    </a:srgbClr>
+                  </a:outerShdw>
+                </a:effectLst>
+              </a:rPr>
+              <a:t>≠</a:t>
+            </a:r>
+            <a:r>
+              <a:rPr lang="en-US" sz="3200" dirty="0" smtClean="0"/>
+              <a:t> access</a:t>
+            </a:r>
+            <a:r>
+              <a:rPr lang="en-US" sz="3200" dirty="0" smtClean="0"/>
+              <a:t>.</a:t>
+            </a:r>
+            <a:endParaRPr lang="en-US" sz="3200" dirty="0"/>
+          </a:p>
+          <a:p>
+            <a:pPr marL="0" indent="0" algn="ctr">
+              <a:buNone/>
+            </a:pPr>
+            <a:r>
+              <a:rPr lang="en-US" sz="3200" dirty="0" smtClean="0"/>
+              <a:t>Digitization </a:t>
+            </a:r>
+            <a:r>
+              <a:rPr lang="en-US" sz="3200" dirty="0" smtClean="0">
+                <a:effectLst>
+                  <a:outerShdw blurRad="38100" dist="38100" dir="2700000" algn="tl">
+                    <a:srgbClr val="000000">
+                      <a:alpha val="43137"/>
+                    </a:srgbClr>
+                  </a:outerShdw>
+                </a:effectLst>
+              </a:rPr>
+              <a:t>≠ preservation.</a:t>
+            </a:r>
+          </a:p>
+          <a:p>
+            <a:pPr marL="0" indent="0" algn="ctr">
+              <a:buNone/>
+            </a:pPr>
+            <a:endParaRPr lang="en-US" sz="3200" dirty="0" smtClean="0"/>
+          </a:p>
+          <a:p>
+            <a:pPr marL="0" indent="0" algn="ctr">
+              <a:buNone/>
+            </a:pPr>
+            <a:r>
+              <a:rPr lang="en-US" sz="3200" dirty="0" smtClean="0"/>
+              <a:t>Digitization </a:t>
+            </a:r>
+            <a:r>
+              <a:rPr lang="en-US" sz="3200" i="1" u="sng" dirty="0" smtClean="0"/>
+              <a:t>without a long term storage and preservation plan </a:t>
+            </a:r>
+            <a:r>
+              <a:rPr lang="en-US" sz="3200" dirty="0" smtClean="0"/>
+              <a:t>is a waste of time and resources.</a:t>
+            </a:r>
+          </a:p>
+          <a:p>
+            <a:pPr marL="0" indent="0">
+              <a:buNone/>
+            </a:pPr>
             <a:endParaRPr lang="en-US" dirty="0"/>
           </a:p>
           <a:p>
-            <a:r>
-              <a:rPr lang="en-US" dirty="0" smtClean="0"/>
-              <a:t>Use/Develop local documentation</a:t>
-            </a:r>
-          </a:p>
-          <a:p>
-            <a:pPr lvl="1"/>
-            <a:r>
-              <a:rPr lang="en-US" dirty="0" smtClean="0"/>
-              <a:t>It allows for consistency, reduces redundancy, provides context to work, creates historical record for future understanding</a:t>
-            </a:r>
+            <a:pPr marL="0" indent="0">
+              <a:buNone/>
+            </a:pPr>
+            <a:endParaRPr lang="en-US" dirty="0" smtClean="0"/>
+          </a:p>
+          <a:p>
+            <a:pPr marL="0" indent="0">
+              <a:buNone/>
+            </a:pPr>
+            <a:endParaRPr lang="en-US" dirty="0"/>
+          </a:p>
+          <a:p>
+            <a:pPr marL="0" indent="0">
+              <a:buNone/>
+            </a:pPr>
+            <a:endParaRPr lang="en-US" dirty="0"/>
+          </a:p>
+        </p:txBody>
+      </p:sp>
+      <p:pic>
+        <p:nvPicPr>
+          <p:cNvPr id="4" name="Picture 4" descr="Hark! the herald angels sing, No, we can't digitize everything!"/>
+          <p:cNvPicPr>
+            <a:picLocks noChangeAspect="1" noChangeArrowheads="1"/>
+          </p:cNvPicPr>
+          <p:nvPr/>
+        </p:nvPicPr>
+        <p:blipFill>
+          <a:blip r:embed="rId3">
+            <a:extLst>
+              <a:ext uri="{28A0092B-C50C-407E-A947-70E740481C1C}">
+                <a14:useLocalDpi xmlns:a14="http://schemas.microsoft.com/office/drawing/2010/main" val="0"/>
+              </a:ext>
+            </a:extLst>
+          </a:blip>
+          <a:srcRect/>
+          <a:stretch>
+            <a:fillRect/>
+          </a:stretch>
+        </p:blipFill>
+        <p:spPr bwMode="auto">
+          <a:xfrm>
+            <a:off x="1183822" y="186404"/>
+            <a:ext cx="4286250" cy="5695950"/>
+          </a:xfrm>
+          <a:prstGeom prst="rect">
+            <a:avLst/>
+          </a:prstGeom>
+          <a:noFill/>
+          <a:extLst>
+            <a:ext uri="{909E8E84-426E-40DD-AFC4-6F175D3DCCD1}">
+              <a14:hiddenFill xmlns:a14="http://schemas.microsoft.com/office/drawing/2010/main">
+                <a:solidFill>
+                  <a:srgbClr val="FFFFFF"/>
+                </a:solidFill>
+              </a14:hiddenFill>
+            </a:ext>
+          </a:extLst>
+        </p:spPr>
+      </p:pic>
+      <p:sp>
+        <p:nvSpPr>
+          <p:cNvPr id="5" name="TextBox 4"/>
+          <p:cNvSpPr txBox="1"/>
+          <p:nvPr/>
+        </p:nvSpPr>
+        <p:spPr>
+          <a:xfrm>
+            <a:off x="1183822" y="5882354"/>
+            <a:ext cx="4037013" cy="600164"/>
+          </a:xfrm>
+          <a:prstGeom prst="rect">
+            <a:avLst/>
+          </a:prstGeom>
+          <a:noFill/>
+        </p:spPr>
+        <p:txBody>
+          <a:bodyPr wrap="square" rtlCol="0">
+            <a:spAutoFit/>
+          </a:bodyPr>
+          <a:lstStyle/>
+          <a:p>
+            <a:r>
+              <a:rPr lang="en-US" sz="1100" dirty="0" smtClean="0"/>
+              <a:t>Image credit: https://derangementanddescription.wordpress.com/2013/12/24/holiday-cards-for-archivists/</a:t>
+            </a:r>
+            <a:endParaRPr lang="en-US" sz="1100" dirty="0"/>
           </a:p>
         </p:txBody>
       </p:sp>
     </p:spTree>
     <p:extLst>
       <p:ext uri="{BB962C8B-B14F-4D97-AF65-F5344CB8AC3E}">
-        <p14:creationId xmlns:p14="http://schemas.microsoft.com/office/powerpoint/2010/main" val="3538021756"/>
+        <p14:creationId xmlns:p14="http://schemas.microsoft.com/office/powerpoint/2010/main" val="4017781785"/>
       </p:ext>
     </p:extLst>
   </p:cSld>
@@ -6333,7 +6588,7 @@
 </p:sld>
 </file>
 
-<file path=ppt/slides/slide2.xml><?xml version="1.0" encoding="utf-8"?>
+<file path=ppt/slides/slide3.xml><?xml version="1.0" encoding="utf-8"?>
 <p:sld xmlns:a="http://schemas.openxmlformats.org/drawingml/2006/main" xmlns:r="http://schemas.openxmlformats.org/officeDocument/2006/relationships" xmlns:p="http://schemas.openxmlformats.org/presentationml/2006/main">
   <p:cSld>
     <p:spTree>
@@ -6434,258 +6689,7 @@
 </p:sld>
 </file>
 
-<file path=ppt/slides/slide3.xml><?xml version="1.0" encoding="utf-8"?>
-<p:sld xmlns:a="http://schemas.openxmlformats.org/drawingml/2006/main" xmlns:r="http://schemas.openxmlformats.org/officeDocument/2006/relationships" xmlns:p="http://schemas.openxmlformats.org/presentationml/2006/main">
-  <p:cSld>
-    <p:spTree>
-      <p:nvGrpSpPr>
-        <p:cNvPr id="1" name=""/>
-        <p:cNvGrpSpPr/>
-        <p:nvPr/>
-      </p:nvGrpSpPr>
-      <p:grpSpPr>
-        <a:xfrm>
-          <a:off x="0" y="0"/>
-          <a:ext cx="0" cy="0"/>
-          <a:chOff x="0" y="0"/>
-          <a:chExt cx="0" cy="0"/>
-        </a:xfrm>
-      </p:grpSpPr>
-      <p:sp>
-        <p:nvSpPr>
-          <p:cNvPr id="3" name="Content Placeholder 2"/>
-          <p:cNvSpPr>
-            <a:spLocks noGrp="1"/>
-          </p:cNvSpPr>
-          <p:nvPr>
-            <p:ph idx="1"/>
-          </p:nvPr>
-        </p:nvSpPr>
-        <p:spPr>
-          <a:xfrm>
-            <a:off x="5755822" y="186404"/>
-            <a:ext cx="4514849" cy="5695950"/>
-          </a:xfrm>
-        </p:spPr>
-        <p:txBody>
-          <a:bodyPr/>
-          <a:lstStyle/>
-          <a:p>
-            <a:pPr marL="0" indent="0" algn="ctr">
-              <a:buNone/>
-            </a:pPr>
-            <a:endParaRPr lang="en-US" sz="2800" dirty="0" smtClean="0"/>
-          </a:p>
-          <a:p>
-            <a:pPr marL="0" indent="0" algn="ctr">
-              <a:buNone/>
-            </a:pPr>
-            <a:r>
-              <a:rPr lang="en-US" sz="2800" dirty="0" smtClean="0"/>
-              <a:t>Digitization does not always equal access.</a:t>
-            </a:r>
-            <a:endParaRPr lang="en-US" sz="2800" dirty="0"/>
-          </a:p>
-          <a:p>
-            <a:pPr marL="0" indent="0" algn="ctr">
-              <a:buNone/>
-            </a:pPr>
-            <a:endParaRPr lang="en-US" sz="2800" dirty="0" smtClean="0"/>
-          </a:p>
-          <a:p>
-            <a:pPr marL="0" indent="0" algn="ctr">
-              <a:buNone/>
-            </a:pPr>
-            <a:r>
-              <a:rPr lang="en-US" sz="2800" dirty="0" smtClean="0"/>
-              <a:t>Digitization without a long term storage and preservation plan is a waste of time and resources.</a:t>
-            </a:r>
-          </a:p>
-          <a:p>
-            <a:pPr marL="0" indent="0">
-              <a:buNone/>
-            </a:pPr>
-            <a:endParaRPr lang="en-US" dirty="0"/>
-          </a:p>
-          <a:p>
-            <a:pPr marL="0" indent="0">
-              <a:buNone/>
-            </a:pPr>
-            <a:endParaRPr lang="en-US" dirty="0" smtClean="0"/>
-          </a:p>
-          <a:p>
-            <a:pPr marL="0" indent="0">
-              <a:buNone/>
-            </a:pPr>
-            <a:endParaRPr lang="en-US" dirty="0"/>
-          </a:p>
-          <a:p>
-            <a:pPr marL="0" indent="0">
-              <a:buNone/>
-            </a:pPr>
-            <a:endParaRPr lang="en-US" dirty="0"/>
-          </a:p>
-        </p:txBody>
-      </p:sp>
-      <p:pic>
-        <p:nvPicPr>
-          <p:cNvPr id="4" name="Picture 4" descr="Hark! the herald angels sing, No, we can't digitize everything!"/>
-          <p:cNvPicPr>
-            <a:picLocks noChangeAspect="1" noChangeArrowheads="1"/>
-          </p:cNvPicPr>
-          <p:nvPr/>
-        </p:nvPicPr>
-        <p:blipFill>
-          <a:blip r:embed="rId2">
-            <a:extLst>
-              <a:ext uri="{28A0092B-C50C-407E-A947-70E740481C1C}">
-                <a14:useLocalDpi xmlns:a14="http://schemas.microsoft.com/office/drawing/2010/main" val="0"/>
-              </a:ext>
-            </a:extLst>
-          </a:blip>
-          <a:srcRect/>
-          <a:stretch>
-            <a:fillRect/>
-          </a:stretch>
-        </p:blipFill>
-        <p:spPr bwMode="auto">
-          <a:xfrm>
-            <a:off x="1183822" y="186404"/>
-            <a:ext cx="4286250" cy="5695950"/>
-          </a:xfrm>
-          <a:prstGeom prst="rect">
-            <a:avLst/>
-          </a:prstGeom>
-          <a:noFill/>
-          <a:extLst>
-            <a:ext uri="{909E8E84-426E-40DD-AFC4-6F175D3DCCD1}">
-              <a14:hiddenFill xmlns:a14="http://schemas.microsoft.com/office/drawing/2010/main">
-                <a:solidFill>
-                  <a:srgbClr val="FFFFFF"/>
-                </a:solidFill>
-              </a14:hiddenFill>
-            </a:ext>
-          </a:extLst>
-        </p:spPr>
-      </p:pic>
-      <p:sp>
-        <p:nvSpPr>
-          <p:cNvPr id="5" name="TextBox 4"/>
-          <p:cNvSpPr txBox="1"/>
-          <p:nvPr/>
-        </p:nvSpPr>
-        <p:spPr>
-          <a:xfrm>
-            <a:off x="1183822" y="5882354"/>
-            <a:ext cx="4037013" cy="600164"/>
-          </a:xfrm>
-          <a:prstGeom prst="rect">
-            <a:avLst/>
-          </a:prstGeom>
-          <a:noFill/>
-        </p:spPr>
-        <p:txBody>
-          <a:bodyPr wrap="square" rtlCol="0">
-            <a:spAutoFit/>
-          </a:bodyPr>
-          <a:lstStyle/>
-          <a:p>
-            <a:r>
-              <a:rPr lang="en-US" sz="1100" dirty="0" smtClean="0"/>
-              <a:t>Image credit: https://derangementanddescription.wordpress.com/2013/12/24/holiday-cards-for-archivists/</a:t>
-            </a:r>
-            <a:endParaRPr lang="en-US" sz="1100" dirty="0"/>
-          </a:p>
-        </p:txBody>
-      </p:sp>
-    </p:spTree>
-    <p:extLst>
-      <p:ext uri="{BB962C8B-B14F-4D97-AF65-F5344CB8AC3E}">
-        <p14:creationId xmlns:p14="http://schemas.microsoft.com/office/powerpoint/2010/main" val="4017781785"/>
-      </p:ext>
-    </p:extLst>
-  </p:cSld>
-  <p:clrMapOvr>
-    <a:masterClrMapping/>
-  </p:clrMapOvr>
-</p:sld>
-</file>
-
 <file path=ppt/slides/slide4.xml><?xml version="1.0" encoding="utf-8"?>
-<p:sld xmlns:a="http://schemas.openxmlformats.org/drawingml/2006/main" xmlns:r="http://schemas.openxmlformats.org/officeDocument/2006/relationships" xmlns:p="http://schemas.openxmlformats.org/presentationml/2006/main">
-  <p:cSld>
-    <p:spTree>
-      <p:nvGrpSpPr>
-        <p:cNvPr id="1" name=""/>
-        <p:cNvGrpSpPr/>
-        <p:nvPr/>
-      </p:nvGrpSpPr>
-      <p:grpSpPr>
-        <a:xfrm>
-          <a:off x="0" y="0"/>
-          <a:ext cx="0" cy="0"/>
-          <a:chOff x="0" y="0"/>
-          <a:chExt cx="0" cy="0"/>
-        </a:xfrm>
-      </p:grpSpPr>
-      <p:sp>
-        <p:nvSpPr>
-          <p:cNvPr id="2" name="Title 1"/>
-          <p:cNvSpPr>
-            <a:spLocks noGrp="1"/>
-          </p:cNvSpPr>
-          <p:nvPr>
-            <p:ph type="title"/>
-          </p:nvPr>
-        </p:nvSpPr>
-        <p:spPr/>
-        <p:txBody>
-          <a:bodyPr/>
-          <a:lstStyle/>
-          <a:p>
-            <a:endParaRPr lang="en-US"/>
-          </a:p>
-        </p:txBody>
-      </p:sp>
-      <p:sp>
-        <p:nvSpPr>
-          <p:cNvPr id="3" name="Content Placeholder 2"/>
-          <p:cNvSpPr>
-            <a:spLocks noGrp="1"/>
-          </p:cNvSpPr>
-          <p:nvPr>
-            <p:ph idx="1"/>
-          </p:nvPr>
-        </p:nvSpPr>
-        <p:spPr/>
-        <p:txBody>
-          <a:bodyPr/>
-          <a:lstStyle/>
-          <a:p>
-            <a:r>
-              <a:rPr lang="en-US" dirty="0" smtClean="0"/>
-              <a:t>Donor requirements</a:t>
-            </a:r>
-          </a:p>
-          <a:p>
-            <a:endParaRPr lang="en-US" dirty="0"/>
-          </a:p>
-        </p:txBody>
-      </p:sp>
-    </p:spTree>
-    <p:extLst>
-      <p:ext uri="{BB962C8B-B14F-4D97-AF65-F5344CB8AC3E}">
-        <p14:creationId xmlns:p14="http://schemas.microsoft.com/office/powerpoint/2010/main" val="1030166978"/>
-      </p:ext>
-    </p:extLst>
-  </p:cSld>
-  <p:clrMapOvr>
-    <a:masterClrMapping/>
-  </p:clrMapOvr>
-</p:sld>
-</file>
-
-<file path=ppt/slides/slide5.xml><?xml version="1.0" encoding="utf-8"?>
 <p:sld xmlns:a="http://schemas.openxmlformats.org/drawingml/2006/main" xmlns:r="http://schemas.openxmlformats.org/officeDocument/2006/relationships" xmlns:p="http://schemas.openxmlformats.org/presentationml/2006/main">
   <p:cSld>
     <p:spTree>
@@ -6725,7 +6729,7 @@
         </p:blipFill>
         <p:spPr bwMode="auto">
           <a:xfrm>
-            <a:off x="1830293" y="1347555"/>
+            <a:off x="1945231" y="1261291"/>
             <a:ext cx="8440379" cy="4769694"/>
           </a:xfrm>
           <a:prstGeom prst="rect">
@@ -6751,7 +6755,7 @@
         </p:nvSpPr>
         <p:spPr>
           <a:xfrm>
-            <a:off x="1755321" y="6117249"/>
+            <a:off x="1945231" y="6084662"/>
             <a:ext cx="9168493" cy="523220"/>
           </a:xfrm>
           <a:prstGeom prst="rect">
@@ -6802,8 +6806,8 @@
         </p:nvSpPr>
         <p:spPr>
           <a:xfrm>
-            <a:off x="424542" y="670261"/>
-            <a:ext cx="11397343" cy="1326321"/>
+            <a:off x="336430" y="684394"/>
+            <a:ext cx="11657983" cy="1326321"/>
           </a:xfrm>
           <a:prstGeom prst="rect">
             <a:avLst/>
@@ -6840,7 +6844,15 @@
           <a:p>
             <a:r>
               <a:rPr lang="en-US" dirty="0" smtClean="0"/>
-              <a:t>Battle for the Institutional Repository</a:t>
+              <a:t>Battle </a:t>
+            </a:r>
+            <a:r>
+              <a:rPr lang="en-US" dirty="0" smtClean="0"/>
+              <a:t>over </a:t>
+            </a:r>
+            <a:r>
+              <a:rPr lang="en-US" dirty="0" smtClean="0"/>
+              <a:t>the Institutional Repository</a:t>
             </a:r>
             <a:endParaRPr lang="en-US" dirty="0"/>
           </a:p>
@@ -6850,6 +6862,90 @@
     <p:extLst>
       <p:ext uri="{BB962C8B-B14F-4D97-AF65-F5344CB8AC3E}">
         <p14:creationId xmlns:p14="http://schemas.microsoft.com/office/powerpoint/2010/main" val="3633335815"/>
+      </p:ext>
+    </p:extLst>
+  </p:cSld>
+  <p:clrMapOvr>
+    <a:masterClrMapping/>
+  </p:clrMapOvr>
+</p:sld>
+</file>
+
+<file path=ppt/slides/slide5.xml><?xml version="1.0" encoding="utf-8"?>
+<p:sld xmlns:a="http://schemas.openxmlformats.org/drawingml/2006/main" xmlns:r="http://schemas.openxmlformats.org/officeDocument/2006/relationships" xmlns:p="http://schemas.openxmlformats.org/presentationml/2006/main">
+  <p:cSld>
+    <p:spTree>
+      <p:nvGrpSpPr>
+        <p:cNvPr id="1" name=""/>
+        <p:cNvGrpSpPr/>
+        <p:nvPr/>
+      </p:nvGrpSpPr>
+      <p:grpSpPr>
+        <a:xfrm>
+          <a:off x="0" y="0"/>
+          <a:ext cx="0" cy="0"/>
+          <a:chOff x="0" y="0"/>
+          <a:chExt cx="0" cy="0"/>
+        </a:xfrm>
+      </p:grpSpPr>
+      <p:sp>
+        <p:nvSpPr>
+          <p:cNvPr id="2" name="Title 1"/>
+          <p:cNvSpPr>
+            <a:spLocks noGrp="1"/>
+          </p:cNvSpPr>
+          <p:nvPr>
+            <p:ph type="title"/>
+          </p:nvPr>
+        </p:nvSpPr>
+        <p:spPr>
+          <a:xfrm>
+            <a:off x="1129455" y="5386207"/>
+            <a:ext cx="10353761" cy="1326321"/>
+          </a:xfrm>
+        </p:spPr>
+        <p:txBody>
+          <a:bodyPr>
+            <a:normAutofit fontScale="90000"/>
+          </a:bodyPr>
+          <a:lstStyle/>
+          <a:p>
+            <a:r>
+              <a:rPr lang="en-US" dirty="0" smtClean="0"/>
+              <a:t>(Some) Organizations Addressing Digital Preservation Standards and Tools</a:t>
+            </a:r>
+            <a:endParaRPr lang="en-US" dirty="0"/>
+          </a:p>
+        </p:txBody>
+      </p:sp>
+      <p:pic>
+        <p:nvPicPr>
+          <p:cNvPr id="5" name="Picture 4"/>
+          <p:cNvPicPr>
+            <a:picLocks noChangeAspect="1"/>
+          </p:cNvPicPr>
+          <p:nvPr/>
+        </p:nvPicPr>
+        <p:blipFill>
+          <a:blip r:embed="rId2"/>
+          <a:stretch>
+            <a:fillRect/>
+          </a:stretch>
+        </p:blipFill>
+        <p:spPr>
+          <a:xfrm>
+            <a:off x="210270" y="195082"/>
+            <a:ext cx="11791950" cy="5191125"/>
+          </a:xfrm>
+          <a:prstGeom prst="rect">
+            <a:avLst/>
+          </a:prstGeom>
+        </p:spPr>
+      </p:pic>
+    </p:spTree>
+    <p:extLst>
+      <p:ext uri="{BB962C8B-B14F-4D97-AF65-F5344CB8AC3E}">
+        <p14:creationId xmlns:p14="http://schemas.microsoft.com/office/powerpoint/2010/main" val="1030166978"/>
       </p:ext>
     </p:extLst>
   </p:cSld>
@@ -7269,49 +7365,31 @@
           <a:p>
             <a:r>
               <a:rPr lang="en-US" dirty="0" smtClean="0"/>
-              <a:t>Primary obstacles to discoverability:</a:t>
+              <a:t>OAIS Reference Model</a:t>
+            </a:r>
+          </a:p>
+          <a:p>
+            <a:endParaRPr lang="en-US" dirty="0"/>
+          </a:p>
+          <a:p>
+            <a:r>
+              <a:rPr lang="en-US" dirty="0" smtClean="0"/>
+              <a:t>Use/Develop local documentation</a:t>
             </a:r>
           </a:p>
           <a:p>
             <a:pPr lvl="1"/>
             <a:r>
               <a:rPr lang="en-US" dirty="0" smtClean="0"/>
-              <a:t>Broken URL’s</a:t>
-            </a:r>
-          </a:p>
-          <a:p>
-            <a:pPr lvl="1"/>
-            <a:r>
-              <a:rPr lang="en-US" dirty="0" smtClean="0"/>
-              <a:t>Lack of description</a:t>
-            </a:r>
-          </a:p>
-          <a:p>
-            <a:pPr lvl="1"/>
-            <a:r>
-              <a:rPr lang="en-US" dirty="0" smtClean="0"/>
-              <a:t>Lack of organization</a:t>
-            </a:r>
-          </a:p>
-          <a:p>
-            <a:pPr lvl="1"/>
-            <a:r>
-              <a:rPr lang="en-US" dirty="0" smtClean="0"/>
-              <a:t>Lack of accessibility</a:t>
-            </a:r>
-          </a:p>
-          <a:p>
-            <a:pPr marL="457200" lvl="1" indent="0">
-              <a:buNone/>
-            </a:pPr>
-            <a:endParaRPr lang="en-US" dirty="0"/>
+              <a:t>It allows for consistency, reduces redundancy, provides context to work, creates historical record for future understanding</a:t>
+            </a:r>
           </a:p>
         </p:txBody>
       </p:sp>
     </p:spTree>
     <p:extLst>
       <p:ext uri="{BB962C8B-B14F-4D97-AF65-F5344CB8AC3E}">
-        <p14:creationId xmlns:p14="http://schemas.microsoft.com/office/powerpoint/2010/main" val="2991406199"/>
+        <p14:creationId xmlns:p14="http://schemas.microsoft.com/office/powerpoint/2010/main" val="3538021756"/>
       </p:ext>
     </p:extLst>
   </p:cSld>

</xml_diff>

<commit_message>
Auto stash before merge of "gh-pages" and "origin/gh-pages"
</commit_message>
<xml_diff>
--- a/fig/Cultivating a Culture of Digital Preservation.pptx
+++ b/fig/Cultivating a Culture of Digital Preservation.pptx
@@ -6426,11 +6426,7 @@
             </a:r>
             <a:r>
               <a:rPr lang="en-US" sz="3200" dirty="0" smtClean="0"/>
-              <a:t> access</a:t>
-            </a:r>
-            <a:r>
-              <a:rPr lang="en-US" sz="3200" dirty="0" smtClean="0"/>
-              <a:t>.</a:t>
+              <a:t> access.</a:t>
             </a:r>
             <a:endParaRPr lang="en-US" sz="3200" dirty="0"/>
           </a:p>
@@ -6844,15 +6840,7 @@
           <a:p>
             <a:r>
               <a:rPr lang="en-US" dirty="0" smtClean="0"/>
-              <a:t>Battle </a:t>
-            </a:r>
-            <a:r>
-              <a:rPr lang="en-US" dirty="0" smtClean="0"/>
-              <a:t>over </a:t>
-            </a:r>
-            <a:r>
-              <a:rPr lang="en-US" dirty="0" smtClean="0"/>
-              <a:t>the Institutional Repository</a:t>
+              <a:t>Battle over the Institutional Repository</a:t>
             </a:r>
             <a:endParaRPr lang="en-US" dirty="0"/>
           </a:p>

</xml_diff>